<commit_message>
Update Eams Presentation Outline.pptx
Updating presentation powerpoint
</commit_message>
<xml_diff>
--- a/PrototypeAssetSurveyAppDrawer/_Demo Presentation Materials/Eams Presentation Outline.pptx
+++ b/PrototypeAssetSurveyAppDrawer/_Demo Presentation Materials/Eams Presentation Outline.pptx
@@ -8,12 +8,12 @@
     <p:sldId id="256" r:id="rId2"/>
     <p:sldId id="262" r:id="rId3"/>
     <p:sldId id="257" r:id="rId4"/>
-    <p:sldId id="263" r:id="rId5"/>
-    <p:sldId id="258" r:id="rId6"/>
-    <p:sldId id="266" r:id="rId7"/>
-    <p:sldId id="265" r:id="rId8"/>
-    <p:sldId id="267" r:id="rId9"/>
-    <p:sldId id="260" r:id="rId10"/>
+    <p:sldId id="258" r:id="rId5"/>
+    <p:sldId id="260" r:id="rId6"/>
+    <p:sldId id="263" r:id="rId7"/>
+    <p:sldId id="266" r:id="rId8"/>
+    <p:sldId id="265" r:id="rId9"/>
+    <p:sldId id="267" r:id="rId10"/>
     <p:sldId id="264" r:id="rId11"/>
     <p:sldId id="261" r:id="rId12"/>
   </p:sldIdLst>
@@ -5983,7 +5983,7 @@
       <dsp:spPr>
         <a:xfrm>
           <a:off x="2122629" y="0"/>
-          <a:ext cx="1509048" cy="1164156"/>
+          <a:ext cx="1509048" cy="1183541"/>
         </a:xfrm>
         <a:prstGeom prst="rect">
           <a:avLst/>
@@ -6031,8 +6031,8 @@
       </dsp:nvSpPr>
       <dsp:spPr>
         <a:xfrm>
-          <a:off x="721370" y="1283948"/>
-          <a:ext cx="4311566" cy="498924"/>
+          <a:off x="721370" y="1305328"/>
+          <a:ext cx="4311566" cy="507232"/>
         </a:xfrm>
         <a:prstGeom prst="rect">
           <a:avLst/>
@@ -6061,7 +6061,7 @@
         </a:bodyPr>
         <a:lstStyle/>
         <a:p>
-          <a:pPr marL="0" lvl="0" indent="0" algn="ctr" defTabSz="1511300">
+          <a:pPr marL="0" lvl="0" indent="0" algn="ctr" defTabSz="1466850">
             <a:lnSpc>
               <a:spcPct val="90000"/>
             </a:lnSpc>
@@ -6075,15 +6075,15 @@
             <a:defRPr b="1"/>
           </a:pPr>
           <a:r>
-            <a:rPr lang="en-GB" sz="3400" kern="1200"/>
+            <a:rPr lang="en-GB" sz="3300" kern="1200"/>
             <a:t>Project requirements</a:t>
           </a:r>
-          <a:endParaRPr lang="en-US" sz="3400" kern="1200"/>
+          <a:endParaRPr lang="en-US" sz="3300" kern="1200"/>
         </a:p>
       </dsp:txBody>
       <dsp:txXfrm>
-        <a:off x="721370" y="1283948"/>
-        <a:ext cx="4311566" cy="498924"/>
+        <a:off x="721370" y="1305328"/>
+        <a:ext cx="4311566" cy="507232"/>
       </dsp:txXfrm>
     </dsp:sp>
     <dsp:sp modelId="{010324A4-E54A-4E3B-BCEF-B382CBC8B3F8}">
@@ -6093,8 +6093,8 @@
       </dsp:nvSpPr>
       <dsp:spPr>
         <a:xfrm>
-          <a:off x="721370" y="1838590"/>
-          <a:ext cx="4311566" cy="1776147"/>
+          <a:off x="721370" y="1869205"/>
+          <a:ext cx="4311566" cy="1745532"/>
         </a:xfrm>
         <a:prstGeom prst="rect">
           <a:avLst/>
@@ -6219,8 +6219,8 @@
         </a:p>
       </dsp:txBody>
       <dsp:txXfrm>
-        <a:off x="721370" y="1838590"/>
-        <a:ext cx="4311566" cy="1776147"/>
+        <a:off x="721370" y="1869205"/>
+        <a:ext cx="4311566" cy="1745532"/>
       </dsp:txXfrm>
     </dsp:sp>
     <dsp:sp modelId="{4E04F7AE-F681-4A8A-82B9-1C445A3D3078}">
@@ -6231,7 +6231,7 @@
       <dsp:spPr>
         <a:xfrm>
           <a:off x="7188720" y="0"/>
-          <a:ext cx="1509048" cy="1164156"/>
+          <a:ext cx="1509048" cy="1183541"/>
         </a:xfrm>
         <a:prstGeom prst="rect">
           <a:avLst/>
@@ -6279,8 +6279,8 @@
       </dsp:nvSpPr>
       <dsp:spPr>
         <a:xfrm>
-          <a:off x="5787461" y="1283948"/>
-          <a:ext cx="4311566" cy="498924"/>
+          <a:off x="5787461" y="1305328"/>
+          <a:ext cx="4311566" cy="507232"/>
         </a:xfrm>
         <a:prstGeom prst="rect">
           <a:avLst/>
@@ -6309,7 +6309,7 @@
         </a:bodyPr>
         <a:lstStyle/>
         <a:p>
-          <a:pPr marL="0" lvl="0" indent="0" algn="ctr" defTabSz="1511300">
+          <a:pPr marL="0" lvl="0" indent="0" algn="ctr" defTabSz="1466850">
             <a:lnSpc>
               <a:spcPct val="90000"/>
             </a:lnSpc>
@@ -6323,15 +6323,15 @@
             <a:defRPr b="1"/>
           </a:pPr>
           <a:r>
-            <a:rPr lang="en-GB" sz="3400" kern="1200"/>
+            <a:rPr lang="en-GB" sz="3300" kern="1200"/>
             <a:t>App specifications</a:t>
           </a:r>
-          <a:endParaRPr lang="en-US" sz="3400" kern="1200"/>
+          <a:endParaRPr lang="en-US" sz="3300" kern="1200"/>
         </a:p>
       </dsp:txBody>
       <dsp:txXfrm>
-        <a:off x="5787461" y="1283948"/>
-        <a:ext cx="4311566" cy="498924"/>
+        <a:off x="5787461" y="1305328"/>
+        <a:ext cx="4311566" cy="507232"/>
       </dsp:txXfrm>
     </dsp:sp>
     <dsp:sp modelId="{5E586880-0152-489B-9688-E2D47340ECF3}">
@@ -6341,8 +6341,8 @@
       </dsp:nvSpPr>
       <dsp:spPr>
         <a:xfrm>
-          <a:off x="5787461" y="1838590"/>
-          <a:ext cx="4311566" cy="1776147"/>
+          <a:off x="5787461" y="1869205"/>
+          <a:ext cx="4311566" cy="1745532"/>
         </a:xfrm>
         <a:prstGeom prst="rect">
           <a:avLst/>
@@ -6486,8 +6486,8 @@
         </a:p>
       </dsp:txBody>
       <dsp:txXfrm>
-        <a:off x="5787461" y="1838590"/>
-        <a:ext cx="4311566" cy="1776147"/>
+        <a:off x="5787461" y="1869205"/>
+        <a:ext cx="4311566" cy="1745532"/>
       </dsp:txXfrm>
     </dsp:sp>
   </dsp:spTree>
@@ -7920,7 +7920,7 @@
           <a:p>
             <a:fld id="{0991E030-3B68-402F-9B86-912F789FDD7F}" type="datetimeFigureOut">
               <a:rPr lang="en-GB" smtClean="0"/>
-              <a:t>31/08/2019</a:t>
+              <a:t>02/09/2019</a:t>
             </a:fld>
             <a:endParaRPr lang="en-GB"/>
           </a:p>
@@ -8356,7 +8356,7 @@
           <a:p>
             <a:fld id="{0991E030-3B68-402F-9B86-912F789FDD7F}" type="datetimeFigureOut">
               <a:rPr lang="en-GB" smtClean="0"/>
-              <a:t>31/08/2019</a:t>
+              <a:t>02/09/2019</a:t>
             </a:fld>
             <a:endParaRPr lang="en-GB"/>
           </a:p>
@@ -8606,7 +8606,7 @@
           <a:p>
             <a:fld id="{0991E030-3B68-402F-9B86-912F789FDD7F}" type="datetimeFigureOut">
               <a:rPr lang="en-GB" smtClean="0"/>
-              <a:t>31/08/2019</a:t>
+              <a:t>02/09/2019</a:t>
             </a:fld>
             <a:endParaRPr lang="en-GB"/>
           </a:p>
@@ -8914,7 +8914,7 @@
           <a:p>
             <a:fld id="{0991E030-3B68-402F-9B86-912F789FDD7F}" type="datetimeFigureOut">
               <a:rPr lang="en-GB" smtClean="0"/>
-              <a:t>31/08/2019</a:t>
+              <a:t>02/09/2019</a:t>
             </a:fld>
             <a:endParaRPr lang="en-GB"/>
           </a:p>
@@ -9232,7 +9232,7 @@
           <a:p>
             <a:fld id="{0991E030-3B68-402F-9B86-912F789FDD7F}" type="datetimeFigureOut">
               <a:rPr lang="en-GB" smtClean="0"/>
-              <a:t>31/08/2019</a:t>
+              <a:t>02/09/2019</a:t>
             </a:fld>
             <a:endParaRPr lang="en-GB"/>
           </a:p>
@@ -9534,7 +9534,7 @@
           <a:p>
             <a:fld id="{0991E030-3B68-402F-9B86-912F789FDD7F}" type="datetimeFigureOut">
               <a:rPr lang="en-GB" smtClean="0"/>
-              <a:t>31/08/2019</a:t>
+              <a:t>02/09/2019</a:t>
             </a:fld>
             <a:endParaRPr lang="en-GB"/>
           </a:p>
@@ -9901,7 +9901,7 @@
           <a:p>
             <a:fld id="{0991E030-3B68-402F-9B86-912F789FDD7F}" type="datetimeFigureOut">
               <a:rPr lang="en-GB" smtClean="0"/>
-              <a:t>31/08/2019</a:t>
+              <a:t>02/09/2019</a:t>
             </a:fld>
             <a:endParaRPr lang="en-GB"/>
           </a:p>
@@ -10075,7 +10075,7 @@
           <a:p>
             <a:fld id="{0991E030-3B68-402F-9B86-912F789FDD7F}" type="datetimeFigureOut">
               <a:rPr lang="en-GB" smtClean="0"/>
-              <a:t>31/08/2019</a:t>
+              <a:t>02/09/2019</a:t>
             </a:fld>
             <a:endParaRPr lang="en-GB"/>
           </a:p>
@@ -10255,7 +10255,7 @@
           <a:p>
             <a:fld id="{0991E030-3B68-402F-9B86-912F789FDD7F}" type="datetimeFigureOut">
               <a:rPr lang="en-GB" smtClean="0"/>
-              <a:t>31/08/2019</a:t>
+              <a:t>02/09/2019</a:t>
             </a:fld>
             <a:endParaRPr lang="en-GB"/>
           </a:p>
@@ -10425,7 +10425,7 @@
           <a:p>
             <a:fld id="{0991E030-3B68-402F-9B86-912F789FDD7F}" type="datetimeFigureOut">
               <a:rPr lang="en-GB" smtClean="0"/>
-              <a:t>31/08/2019</a:t>
+              <a:t>02/09/2019</a:t>
             </a:fld>
             <a:endParaRPr lang="en-GB"/>
           </a:p>
@@ -10675,7 +10675,7 @@
           <a:p>
             <a:fld id="{0991E030-3B68-402F-9B86-912F789FDD7F}" type="datetimeFigureOut">
               <a:rPr lang="en-GB" smtClean="0"/>
-              <a:t>31/08/2019</a:t>
+              <a:t>02/09/2019</a:t>
             </a:fld>
             <a:endParaRPr lang="en-GB"/>
           </a:p>
@@ -10911,7 +10911,7 @@
           <a:p>
             <a:fld id="{0991E030-3B68-402F-9B86-912F789FDD7F}" type="datetimeFigureOut">
               <a:rPr lang="en-GB" smtClean="0"/>
-              <a:t>31/08/2019</a:t>
+              <a:t>02/09/2019</a:t>
             </a:fld>
             <a:endParaRPr lang="en-GB"/>
           </a:p>
@@ -11293,7 +11293,7 @@
           <a:p>
             <a:fld id="{0991E030-3B68-402F-9B86-912F789FDD7F}" type="datetimeFigureOut">
               <a:rPr lang="en-GB" smtClean="0"/>
-              <a:t>31/08/2019</a:t>
+              <a:t>02/09/2019</a:t>
             </a:fld>
             <a:endParaRPr lang="en-GB"/>
           </a:p>
@@ -11411,7 +11411,7 @@
           <a:p>
             <a:fld id="{0991E030-3B68-402F-9B86-912F789FDD7F}" type="datetimeFigureOut">
               <a:rPr lang="en-GB" smtClean="0"/>
-              <a:t>31/08/2019</a:t>
+              <a:t>02/09/2019</a:t>
             </a:fld>
             <a:endParaRPr lang="en-GB"/>
           </a:p>
@@ -11506,7 +11506,7 @@
           <a:p>
             <a:fld id="{0991E030-3B68-402F-9B86-912F789FDD7F}" type="datetimeFigureOut">
               <a:rPr lang="en-GB" smtClean="0"/>
-              <a:t>31/08/2019</a:t>
+              <a:t>02/09/2019</a:t>
             </a:fld>
             <a:endParaRPr lang="en-GB"/>
           </a:p>
@@ -11761,7 +11761,7 @@
           <a:p>
             <a:fld id="{0991E030-3B68-402F-9B86-912F789FDD7F}" type="datetimeFigureOut">
               <a:rPr lang="en-GB" smtClean="0"/>
-              <a:t>31/08/2019</a:t>
+              <a:t>02/09/2019</a:t>
             </a:fld>
             <a:endParaRPr lang="en-GB"/>
           </a:p>
@@ -12044,7 +12044,7 @@
           <a:p>
             <a:fld id="{0991E030-3B68-402F-9B86-912F789FDD7F}" type="datetimeFigureOut">
               <a:rPr lang="en-GB" smtClean="0"/>
-              <a:t>31/08/2019</a:t>
+              <a:t>02/09/2019</a:t>
             </a:fld>
             <a:endParaRPr lang="en-GB"/>
           </a:p>
@@ -12450,7 +12450,7 @@
           <a:p>
             <a:fld id="{0991E030-3B68-402F-9B86-912F789FDD7F}" type="datetimeFigureOut">
               <a:rPr lang="en-GB" smtClean="0"/>
-              <a:t>31/08/2019</a:t>
+              <a:t>02/09/2019</a:t>
             </a:fld>
             <a:endParaRPr lang="en-GB"/>
           </a:p>
@@ -13141,7 +13141,9 @@
           </a:xfrm>
         </p:spPr>
         <p:txBody>
-          <a:bodyPr/>
+          <a:bodyPr>
+            <a:normAutofit lnSpcReduction="10000"/>
+          </a:bodyPr>
           <a:lstStyle/>
           <a:p>
             <a:pPr marL="0" indent="0">
@@ -13204,12 +13206,24 @@
               <a:t>The </a:t>
             </a:r>
             <a:r>
-              <a:rPr lang="en-GB"/>
+              <a:rPr lang="en-GB" dirty="0" err="1"/>
               <a:t>NativeScript</a:t>
             </a:r>
             <a:r>
               <a:rPr lang="en-GB" dirty="0"/>
               <a:t> community on Slack</a:t>
+            </a:r>
+          </a:p>
+          <a:p>
+            <a:r>
+              <a:rPr lang="en-GB" dirty="0"/>
+              <a:t>Friends and family</a:t>
+            </a:r>
+          </a:p>
+          <a:p>
+            <a:r>
+              <a:rPr lang="en-GB" dirty="0"/>
+              <a:t>Several book shelves worth of reading material.</a:t>
             </a:r>
           </a:p>
         </p:txBody>
@@ -13263,16 +13277,28 @@
         <p:spPr>
           <a:xfrm>
             <a:off x="684212" y="1005901"/>
-            <a:ext cx="8534400" cy="1507067"/>
+            <a:ext cx="10151702" cy="4141021"/>
           </a:xfrm>
         </p:spPr>
         <p:txBody>
-          <a:bodyPr/>
+          <a:bodyPr>
+            <a:normAutofit/>
+          </a:bodyPr>
           <a:lstStyle/>
           <a:p>
             <a:r>
               <a:rPr lang="en-GB" dirty="0"/>
-              <a:t>Any Questions?</a:t>
+              <a:t>Thank you all for your time and patience</a:t>
+            </a:r>
+            <a:br>
+              <a:rPr lang="en-GB" dirty="0"/>
+            </a:br>
+            <a:br>
+              <a:rPr lang="en-GB" dirty="0"/>
+            </a:br>
+            <a:r>
+              <a:rPr lang="en-GB" dirty="0"/>
+              <a:t>Questions and feedback are gratefully welcomed.</a:t>
             </a:r>
           </a:p>
         </p:txBody>
@@ -13937,183 +13963,6 @@
           <p:cNvPr id="2" name="Title 1">
             <a:extLst>
               <a:ext uri="{FF2B5EF4-FFF2-40B4-BE49-F238E27FC236}">
-                <a16:creationId xmlns:a16="http://schemas.microsoft.com/office/drawing/2014/main" id="{59A14397-2A63-41C8-8A14-F610CD29EA6B}"/>
-              </a:ext>
-            </a:extLst>
-          </p:cNvPr>
-          <p:cNvSpPr>
-            <a:spLocks noGrp="1"/>
-          </p:cNvSpPr>
-          <p:nvPr>
-            <p:ph type="title"/>
-          </p:nvPr>
-        </p:nvSpPr>
-        <p:spPr/>
-        <p:txBody>
-          <a:bodyPr/>
-          <a:lstStyle/>
-          <a:p>
-            <a:r>
-              <a:rPr lang="en-GB" dirty="0"/>
-              <a:t>Project Milestones</a:t>
-            </a:r>
-          </a:p>
-        </p:txBody>
-      </p:sp>
-      <p:sp>
-        <p:nvSpPr>
-          <p:cNvPr id="3" name="Content Placeholder 2">
-            <a:extLst>
-              <a:ext uri="{FF2B5EF4-FFF2-40B4-BE49-F238E27FC236}">
-                <a16:creationId xmlns:a16="http://schemas.microsoft.com/office/drawing/2014/main" id="{8CD9F6EC-117C-48D5-9161-42E0B169B8FB}"/>
-              </a:ext>
-            </a:extLst>
-          </p:cNvPr>
-          <p:cNvSpPr>
-            <a:spLocks noGrp="1"/>
-          </p:cNvSpPr>
-          <p:nvPr>
-            <p:ph idx="1"/>
-          </p:nvPr>
-        </p:nvSpPr>
-        <p:spPr>
-          <a:xfrm>
-            <a:off x="684212" y="685800"/>
-            <a:ext cx="7226606" cy="4028813"/>
-          </a:xfrm>
-        </p:spPr>
-        <p:txBody>
-          <a:bodyPr>
-            <a:normAutofit lnSpcReduction="10000"/>
-          </a:bodyPr>
-          <a:lstStyle/>
-          <a:p>
-            <a:r>
-              <a:rPr lang="en-GB" dirty="0"/>
-              <a:t>Design the app UI</a:t>
-            </a:r>
-          </a:p>
-          <a:p>
-            <a:r>
-              <a:rPr lang="en-GB" dirty="0"/>
-              <a:t>Research JavaScript frameworks</a:t>
-            </a:r>
-          </a:p>
-          <a:p>
-            <a:r>
-              <a:rPr lang="en-GB" dirty="0"/>
-              <a:t>Research app development software and methods</a:t>
-            </a:r>
-          </a:p>
-          <a:p>
-            <a:r>
-              <a:rPr lang="en-GB" dirty="0"/>
-              <a:t>Research backend services</a:t>
-            </a:r>
-          </a:p>
-          <a:p>
-            <a:r>
-              <a:rPr lang="en-GB" dirty="0"/>
-              <a:t>Build app UI (Build Login Screen, Home Page, Create New Asset Page UI)</a:t>
-            </a:r>
-          </a:p>
-          <a:p>
-            <a:r>
-              <a:rPr lang="en-GB" dirty="0"/>
-              <a:t>Got Login Screen to Function, connect to firebase backend</a:t>
-            </a:r>
-          </a:p>
-          <a:p>
-            <a:r>
-              <a:rPr lang="en-GB" dirty="0"/>
-              <a:t>Create SQL</a:t>
-            </a:r>
-          </a:p>
-          <a:p>
-            <a:r>
-              <a:rPr lang="en-GB" dirty="0"/>
-              <a:t>Add backend functionality to UI frontend</a:t>
-            </a:r>
-          </a:p>
-          <a:p>
-            <a:endParaRPr lang="en-GB" dirty="0"/>
-          </a:p>
-        </p:txBody>
-      </p:sp>
-      <p:pic>
-        <p:nvPicPr>
-          <p:cNvPr id="5" name="Picture 4" descr="Screen shot of the app home screen from an android emulator">
-            <a:extLst>
-              <a:ext uri="{FF2B5EF4-FFF2-40B4-BE49-F238E27FC236}">
-                <a16:creationId xmlns:a16="http://schemas.microsoft.com/office/drawing/2014/main" id="{5168AE0B-41C7-419A-86B1-5C95F9448664}"/>
-              </a:ext>
-              <a:ext uri="{C183D7F6-B498-43B3-948B-1728B52AA6E4}">
-                <adec:decorative xmlns:adec="http://schemas.microsoft.com/office/drawing/2017/decorative" val="0"/>
-              </a:ext>
-            </a:extLst>
-          </p:cNvPr>
-          <p:cNvPicPr>
-            <a:picLocks noChangeAspect="1"/>
-          </p:cNvPicPr>
-          <p:nvPr/>
-        </p:nvPicPr>
-        <p:blipFill>
-          <a:blip r:embed="rId2">
-            <a:extLst>
-              <a:ext uri="{28A0092B-C50C-407E-A947-70E740481C1C}">
-                <a14:useLocalDpi xmlns:a14="http://schemas.microsoft.com/office/drawing/2010/main" val="0"/>
-              </a:ext>
-            </a:extLst>
-          </a:blip>
-          <a:stretch>
-            <a:fillRect/>
-          </a:stretch>
-        </p:blipFill>
-        <p:spPr>
-          <a:xfrm>
-            <a:off x="8556504" y="530290"/>
-            <a:ext cx="2632010" cy="5264020"/>
-          </a:xfrm>
-          <a:prstGeom prst="rect">
-            <a:avLst/>
-          </a:prstGeom>
-        </p:spPr>
-      </p:pic>
-    </p:spTree>
-    <p:extLst>
-      <p:ext uri="{BB962C8B-B14F-4D97-AF65-F5344CB8AC3E}">
-        <p14:creationId xmlns:p14="http://schemas.microsoft.com/office/powerpoint/2010/main" val="1386258990"/>
-      </p:ext>
-    </p:extLst>
-  </p:cSld>
-  <p:clrMapOvr>
-    <a:masterClrMapping/>
-  </p:clrMapOvr>
-</p:sld>
-</file>
-
-<file path=ppt/slides/slide5.xml><?xml version="1.0" encoding="utf-8"?>
-<p:sld xmlns:a="http://schemas.openxmlformats.org/drawingml/2006/main" xmlns:r="http://schemas.openxmlformats.org/officeDocument/2006/relationships" xmlns:p="http://schemas.openxmlformats.org/presentationml/2006/main">
-  <p:cSld>
-    <p:spTree>
-      <p:nvGrpSpPr>
-        <p:cNvPr id="1" name=""/>
-        <p:cNvGrpSpPr/>
-        <p:nvPr/>
-      </p:nvGrpSpPr>
-      <p:grpSpPr>
-        <a:xfrm>
-          <a:off x="0" y="0"/>
-          <a:ext cx="0" cy="0"/>
-          <a:chOff x="0" y="0"/>
-          <a:chExt cx="0" cy="0"/>
-        </a:xfrm>
-      </p:grpSpPr>
-      <p:sp>
-        <p:nvSpPr>
-          <p:cNvPr id="2" name="Title 1">
-            <a:extLst>
-              <a:ext uri="{FF2B5EF4-FFF2-40B4-BE49-F238E27FC236}">
                 <a16:creationId xmlns:a16="http://schemas.microsoft.com/office/drawing/2014/main" id="{5BB997BD-8279-49B5-8973-D85D08CFF31D}"/>
               </a:ext>
             </a:extLst>
@@ -14443,7 +14292,333 @@
 </p:sld>
 </file>
 
+<file path=ppt/slides/slide5.xml><?xml version="1.0" encoding="utf-8"?>
+<p:sld xmlns:a="http://schemas.openxmlformats.org/drawingml/2006/main" xmlns:r="http://schemas.openxmlformats.org/officeDocument/2006/relationships" xmlns:p="http://schemas.openxmlformats.org/presentationml/2006/main">
+  <p:cSld>
+    <p:spTree>
+      <p:nvGrpSpPr>
+        <p:cNvPr id="1" name=""/>
+        <p:cNvGrpSpPr/>
+        <p:nvPr/>
+      </p:nvGrpSpPr>
+      <p:grpSpPr>
+        <a:xfrm>
+          <a:off x="0" y="0"/>
+          <a:ext cx="0" cy="0"/>
+          <a:chOff x="0" y="0"/>
+          <a:chExt cx="0" cy="0"/>
+        </a:xfrm>
+      </p:grpSpPr>
+      <p:sp>
+        <p:nvSpPr>
+          <p:cNvPr id="2" name="Title 1">
+            <a:extLst>
+              <a:ext uri="{FF2B5EF4-FFF2-40B4-BE49-F238E27FC236}">
+                <a16:creationId xmlns:a16="http://schemas.microsoft.com/office/drawing/2014/main" id="{85B364D3-887B-40B2-BBF0-18AF281669AF}"/>
+              </a:ext>
+            </a:extLst>
+          </p:cNvPr>
+          <p:cNvSpPr>
+            <a:spLocks noGrp="1"/>
+          </p:cNvSpPr>
+          <p:nvPr>
+            <p:ph type="title"/>
+          </p:nvPr>
+        </p:nvSpPr>
+        <p:spPr/>
+        <p:txBody>
+          <a:bodyPr/>
+          <a:lstStyle/>
+          <a:p>
+            <a:r>
+              <a:rPr lang="en-GB" dirty="0"/>
+              <a:t>Problems Encountered</a:t>
+            </a:r>
+          </a:p>
+        </p:txBody>
+      </p:sp>
+      <p:sp>
+        <p:nvSpPr>
+          <p:cNvPr id="3" name="Content Placeholder 2">
+            <a:extLst>
+              <a:ext uri="{FF2B5EF4-FFF2-40B4-BE49-F238E27FC236}">
+                <a16:creationId xmlns:a16="http://schemas.microsoft.com/office/drawing/2014/main" id="{8B9F1685-0032-4977-B792-BA4E7B264E4F}"/>
+              </a:ext>
+            </a:extLst>
+          </p:cNvPr>
+          <p:cNvSpPr>
+            <a:spLocks noGrp="1"/>
+          </p:cNvSpPr>
+          <p:nvPr>
+            <p:ph idx="1"/>
+          </p:nvPr>
+        </p:nvSpPr>
+        <p:spPr>
+          <a:xfrm>
+            <a:off x="689687" y="685800"/>
+            <a:ext cx="9795798" cy="4039513"/>
+          </a:xfrm>
+        </p:spPr>
+        <p:txBody>
+          <a:bodyPr/>
+          <a:lstStyle/>
+          <a:p>
+            <a:r>
+              <a:rPr lang="en-GB" dirty="0" err="1"/>
+              <a:t>Multidex</a:t>
+            </a:r>
+            <a:r>
+              <a:rPr lang="en-GB" dirty="0"/>
+              <a:t> support</a:t>
+            </a:r>
+          </a:p>
+          <a:p>
+            <a:r>
+              <a:rPr lang="en-GB" dirty="0"/>
+              <a:t>Firebase authentication</a:t>
+            </a:r>
+          </a:p>
+          <a:p>
+            <a:r>
+              <a:rPr lang="en-GB" dirty="0"/>
+              <a:t>Firebase </a:t>
+            </a:r>
+            <a:r>
+              <a:rPr lang="en-GB" dirty="0" err="1"/>
+              <a:t>firestore</a:t>
+            </a:r>
+            <a:endParaRPr lang="en-GB" dirty="0"/>
+          </a:p>
+          <a:p>
+            <a:r>
+              <a:rPr lang="en-GB" dirty="0"/>
+              <a:t>Had to start the project over several times (going down the wrong path)</a:t>
+            </a:r>
+          </a:p>
+          <a:p>
+            <a:r>
+              <a:rPr lang="en-GB" dirty="0"/>
+              <a:t>Integrating my own code with </a:t>
+            </a:r>
+            <a:r>
+              <a:rPr lang="en-GB" dirty="0" err="1"/>
+              <a:t>NativeScript</a:t>
+            </a:r>
+            <a:r>
+              <a:rPr lang="en-GB" dirty="0"/>
+              <a:t> code samples</a:t>
+            </a:r>
+          </a:p>
+          <a:p>
+            <a:r>
+              <a:rPr lang="en-GB" dirty="0"/>
+              <a:t>Unhelpful and occasionally incorrect documentation</a:t>
+            </a:r>
+          </a:p>
+          <a:p>
+            <a:r>
+              <a:rPr lang="en-GB" dirty="0"/>
+              <a:t>Long lead times on getting advice from online community (through stack overflow, slack, </a:t>
+            </a:r>
+            <a:r>
+              <a:rPr lang="en-GB" dirty="0" err="1"/>
+              <a:t>gitHub</a:t>
+            </a:r>
+            <a:r>
+              <a:rPr lang="en-GB" dirty="0"/>
+              <a:t> etc)</a:t>
+            </a:r>
+          </a:p>
+          <a:p>
+            <a:endParaRPr lang="en-GB" dirty="0"/>
+          </a:p>
+        </p:txBody>
+      </p:sp>
+    </p:spTree>
+    <p:extLst>
+      <p:ext uri="{BB962C8B-B14F-4D97-AF65-F5344CB8AC3E}">
+        <p14:creationId xmlns:p14="http://schemas.microsoft.com/office/powerpoint/2010/main" val="3711536738"/>
+      </p:ext>
+    </p:extLst>
+  </p:cSld>
+  <p:clrMapOvr>
+    <a:masterClrMapping/>
+  </p:clrMapOvr>
+</p:sld>
+</file>
+
 <file path=ppt/slides/slide6.xml><?xml version="1.0" encoding="utf-8"?>
+<p:sld xmlns:a="http://schemas.openxmlformats.org/drawingml/2006/main" xmlns:r="http://schemas.openxmlformats.org/officeDocument/2006/relationships" xmlns:p="http://schemas.openxmlformats.org/presentationml/2006/main">
+  <p:cSld>
+    <p:spTree>
+      <p:nvGrpSpPr>
+        <p:cNvPr id="1" name=""/>
+        <p:cNvGrpSpPr/>
+        <p:nvPr/>
+      </p:nvGrpSpPr>
+      <p:grpSpPr>
+        <a:xfrm>
+          <a:off x="0" y="0"/>
+          <a:ext cx="0" cy="0"/>
+          <a:chOff x="0" y="0"/>
+          <a:chExt cx="0" cy="0"/>
+        </a:xfrm>
+      </p:grpSpPr>
+      <p:sp>
+        <p:nvSpPr>
+          <p:cNvPr id="2" name="Title 1">
+            <a:extLst>
+              <a:ext uri="{FF2B5EF4-FFF2-40B4-BE49-F238E27FC236}">
+                <a16:creationId xmlns:a16="http://schemas.microsoft.com/office/drawing/2014/main" id="{59A14397-2A63-41C8-8A14-F610CD29EA6B}"/>
+              </a:ext>
+            </a:extLst>
+          </p:cNvPr>
+          <p:cNvSpPr>
+            <a:spLocks noGrp="1"/>
+          </p:cNvSpPr>
+          <p:nvPr>
+            <p:ph type="title"/>
+          </p:nvPr>
+        </p:nvSpPr>
+        <p:spPr/>
+        <p:txBody>
+          <a:bodyPr/>
+          <a:lstStyle/>
+          <a:p>
+            <a:r>
+              <a:rPr lang="en-GB" dirty="0"/>
+              <a:t>Project Milestones</a:t>
+            </a:r>
+          </a:p>
+        </p:txBody>
+      </p:sp>
+      <p:sp>
+        <p:nvSpPr>
+          <p:cNvPr id="3" name="Content Placeholder 2">
+            <a:extLst>
+              <a:ext uri="{FF2B5EF4-FFF2-40B4-BE49-F238E27FC236}">
+                <a16:creationId xmlns:a16="http://schemas.microsoft.com/office/drawing/2014/main" id="{8CD9F6EC-117C-48D5-9161-42E0B169B8FB}"/>
+              </a:ext>
+            </a:extLst>
+          </p:cNvPr>
+          <p:cNvSpPr>
+            <a:spLocks noGrp="1"/>
+          </p:cNvSpPr>
+          <p:nvPr>
+            <p:ph idx="1"/>
+          </p:nvPr>
+        </p:nvSpPr>
+        <p:spPr>
+          <a:xfrm>
+            <a:off x="684212" y="691275"/>
+            <a:ext cx="7226606" cy="4028813"/>
+          </a:xfrm>
+        </p:spPr>
+        <p:txBody>
+          <a:bodyPr>
+            <a:normAutofit/>
+          </a:bodyPr>
+          <a:lstStyle/>
+          <a:p>
+            <a:r>
+              <a:rPr lang="en-GB" dirty="0"/>
+              <a:t>Design the app UI</a:t>
+            </a:r>
+          </a:p>
+          <a:p>
+            <a:r>
+              <a:rPr lang="en-GB" dirty="0"/>
+              <a:t>Research JavaScript frameworks</a:t>
+            </a:r>
+          </a:p>
+          <a:p>
+            <a:r>
+              <a:rPr lang="en-GB" dirty="0"/>
+              <a:t>Research app development software and methods</a:t>
+            </a:r>
+          </a:p>
+          <a:p>
+            <a:r>
+              <a:rPr lang="en-GB" dirty="0"/>
+              <a:t>Research backend services</a:t>
+            </a:r>
+          </a:p>
+          <a:p>
+            <a:r>
+              <a:rPr lang="en-GB" dirty="0"/>
+              <a:t>Build app UI (Build Login Screen, Home Page, Create New Asset Page UI)</a:t>
+            </a:r>
+          </a:p>
+          <a:p>
+            <a:r>
+              <a:rPr lang="en-GB" dirty="0"/>
+              <a:t>Got Login Screen to Function, connect to firebase backend</a:t>
+            </a:r>
+          </a:p>
+          <a:p>
+            <a:r>
+              <a:rPr lang="en-GB" dirty="0"/>
+              <a:t>Add backend functionality to UI frontend</a:t>
+            </a:r>
+          </a:p>
+          <a:p>
+            <a:endParaRPr lang="en-GB" dirty="0"/>
+          </a:p>
+        </p:txBody>
+      </p:sp>
+      <p:pic>
+        <p:nvPicPr>
+          <p:cNvPr id="5" name="Picture 4" descr="Screen shot of the app home screen from an android emulator">
+            <a:extLst>
+              <a:ext uri="{FF2B5EF4-FFF2-40B4-BE49-F238E27FC236}">
+                <a16:creationId xmlns:a16="http://schemas.microsoft.com/office/drawing/2014/main" id="{5168AE0B-41C7-419A-86B1-5C95F9448664}"/>
+              </a:ext>
+              <a:ext uri="{C183D7F6-B498-43B3-948B-1728B52AA6E4}">
+                <adec:decorative xmlns:adec="http://schemas.microsoft.com/office/drawing/2017/decorative" val="0"/>
+              </a:ext>
+            </a:extLst>
+          </p:cNvPr>
+          <p:cNvPicPr>
+            <a:picLocks noChangeAspect="1"/>
+          </p:cNvPicPr>
+          <p:nvPr/>
+        </p:nvPicPr>
+        <p:blipFill>
+          <a:blip r:embed="rId2">
+            <a:extLst>
+              <a:ext uri="{28A0092B-C50C-407E-A947-70E740481C1C}">
+                <a14:useLocalDpi xmlns:a14="http://schemas.microsoft.com/office/drawing/2010/main" val="0"/>
+              </a:ext>
+            </a:extLst>
+          </a:blip>
+          <a:stretch>
+            <a:fillRect/>
+          </a:stretch>
+        </p:blipFill>
+        <p:spPr>
+          <a:xfrm>
+            <a:off x="8556504" y="530290"/>
+            <a:ext cx="2632010" cy="5264020"/>
+          </a:xfrm>
+          <a:prstGeom prst="rect">
+            <a:avLst/>
+          </a:prstGeom>
+        </p:spPr>
+      </p:pic>
+    </p:spTree>
+    <p:extLst>
+      <p:ext uri="{BB962C8B-B14F-4D97-AF65-F5344CB8AC3E}">
+        <p14:creationId xmlns:p14="http://schemas.microsoft.com/office/powerpoint/2010/main" val="1386258990"/>
+      </p:ext>
+    </p:extLst>
+  </p:cSld>
+  <p:clrMapOvr>
+    <a:masterClrMapping/>
+  </p:clrMapOvr>
+</p:sld>
+</file>
+
+<file path=ppt/slides/slide7.xml><?xml version="1.0" encoding="utf-8"?>
 <p:sld xmlns:a="http://schemas.openxmlformats.org/drawingml/2006/main" xmlns:r="http://schemas.openxmlformats.org/officeDocument/2006/relationships" xmlns:p="http://schemas.openxmlformats.org/presentationml/2006/main">
   <p:cSld>
     <p:spTree>
@@ -14501,7 +14676,7 @@
 </p:sld>
 </file>
 
-<file path=ppt/slides/slide7.xml><?xml version="1.0" encoding="utf-8"?>
+<file path=ppt/slides/slide8.xml><?xml version="1.0" encoding="utf-8"?>
 <p:sld xmlns:a="http://schemas.openxmlformats.org/drawingml/2006/main" xmlns:r="http://schemas.openxmlformats.org/officeDocument/2006/relationships" xmlns:p="http://schemas.openxmlformats.org/presentationml/2006/main">
   <p:cSld>
     <p:spTree>
@@ -14595,7 +14770,7 @@
 </p:sld>
 </file>
 
-<file path=ppt/slides/slide8.xml><?xml version="1.0" encoding="utf-8"?>
+<file path=ppt/slides/slide9.xml><?xml version="1.0" encoding="utf-8"?>
 <p:sld xmlns:a="http://schemas.openxmlformats.org/drawingml/2006/main" xmlns:r="http://schemas.openxmlformats.org/officeDocument/2006/relationships" xmlns:p="http://schemas.openxmlformats.org/presentationml/2006/main">
   <p:cSld>
     <p:spTree>
@@ -14646,136 +14821,6 @@
     <p:extLst>
       <p:ext uri="{BB962C8B-B14F-4D97-AF65-F5344CB8AC3E}">
         <p14:creationId xmlns:p14="http://schemas.microsoft.com/office/powerpoint/2010/main" val="832417665"/>
-      </p:ext>
-    </p:extLst>
-  </p:cSld>
-  <p:clrMapOvr>
-    <a:masterClrMapping/>
-  </p:clrMapOvr>
-</p:sld>
-</file>
-
-<file path=ppt/slides/slide9.xml><?xml version="1.0" encoding="utf-8"?>
-<p:sld xmlns:a="http://schemas.openxmlformats.org/drawingml/2006/main" xmlns:r="http://schemas.openxmlformats.org/officeDocument/2006/relationships" xmlns:p="http://schemas.openxmlformats.org/presentationml/2006/main">
-  <p:cSld>
-    <p:spTree>
-      <p:nvGrpSpPr>
-        <p:cNvPr id="1" name=""/>
-        <p:cNvGrpSpPr/>
-        <p:nvPr/>
-      </p:nvGrpSpPr>
-      <p:grpSpPr>
-        <a:xfrm>
-          <a:off x="0" y="0"/>
-          <a:ext cx="0" cy="0"/>
-          <a:chOff x="0" y="0"/>
-          <a:chExt cx="0" cy="0"/>
-        </a:xfrm>
-      </p:grpSpPr>
-      <p:sp>
-        <p:nvSpPr>
-          <p:cNvPr id="2" name="Title 1">
-            <a:extLst>
-              <a:ext uri="{FF2B5EF4-FFF2-40B4-BE49-F238E27FC236}">
-                <a16:creationId xmlns:a16="http://schemas.microsoft.com/office/drawing/2014/main" id="{85B364D3-887B-40B2-BBF0-18AF281669AF}"/>
-              </a:ext>
-            </a:extLst>
-          </p:cNvPr>
-          <p:cNvSpPr>
-            <a:spLocks noGrp="1"/>
-          </p:cNvSpPr>
-          <p:nvPr>
-            <p:ph type="title"/>
-          </p:nvPr>
-        </p:nvSpPr>
-        <p:spPr/>
-        <p:txBody>
-          <a:bodyPr/>
-          <a:lstStyle/>
-          <a:p>
-            <a:r>
-              <a:rPr lang="en-GB" dirty="0"/>
-              <a:t>Problems Encountered</a:t>
-            </a:r>
-          </a:p>
-        </p:txBody>
-      </p:sp>
-      <p:sp>
-        <p:nvSpPr>
-          <p:cNvPr id="3" name="Content Placeholder 2">
-            <a:extLst>
-              <a:ext uri="{FF2B5EF4-FFF2-40B4-BE49-F238E27FC236}">
-                <a16:creationId xmlns:a16="http://schemas.microsoft.com/office/drawing/2014/main" id="{8B9F1685-0032-4977-B792-BA4E7B264E4F}"/>
-              </a:ext>
-            </a:extLst>
-          </p:cNvPr>
-          <p:cNvSpPr>
-            <a:spLocks noGrp="1"/>
-          </p:cNvSpPr>
-          <p:nvPr>
-            <p:ph idx="1"/>
-          </p:nvPr>
-        </p:nvSpPr>
-        <p:spPr/>
-        <p:txBody>
-          <a:bodyPr/>
-          <a:lstStyle/>
-          <a:p>
-            <a:r>
-              <a:rPr lang="en-GB" dirty="0" err="1"/>
-              <a:t>Multidex</a:t>
-            </a:r>
-            <a:r>
-              <a:rPr lang="en-GB" dirty="0"/>
-              <a:t> support</a:t>
-            </a:r>
-          </a:p>
-          <a:p>
-            <a:r>
-              <a:rPr lang="en-GB" dirty="0"/>
-              <a:t>Firebase authentication</a:t>
-            </a:r>
-          </a:p>
-          <a:p>
-            <a:r>
-              <a:rPr lang="en-GB" dirty="0"/>
-              <a:t>Firebase </a:t>
-            </a:r>
-            <a:r>
-              <a:rPr lang="en-GB" dirty="0" err="1"/>
-              <a:t>firestore</a:t>
-            </a:r>
-            <a:endParaRPr lang="en-GB" dirty="0"/>
-          </a:p>
-          <a:p>
-            <a:r>
-              <a:rPr lang="en-GB" dirty="0"/>
-              <a:t>Had to start the project over several times</a:t>
-            </a:r>
-          </a:p>
-          <a:p>
-            <a:r>
-              <a:rPr lang="en-GB" dirty="0"/>
-              <a:t>Integrating my own code with </a:t>
-            </a:r>
-            <a:r>
-              <a:rPr lang="en-GB" dirty="0" err="1"/>
-              <a:t>NativeScript</a:t>
-            </a:r>
-            <a:r>
-              <a:rPr lang="en-GB" dirty="0"/>
-              <a:t> code samples</a:t>
-            </a:r>
-          </a:p>
-          <a:p>
-            <a:endParaRPr lang="en-GB" dirty="0"/>
-          </a:p>
-        </p:txBody>
-      </p:sp>
-    </p:spTree>
-    <p:extLst>
-      <p:ext uri="{BB962C8B-B14F-4D97-AF65-F5344CB8AC3E}">
-        <p14:creationId xmlns:p14="http://schemas.microsoft.com/office/powerpoint/2010/main" val="3711536738"/>
       </p:ext>
     </p:extLst>
   </p:cSld>

</xml_diff>